<commit_message>
copy over 04c code, start testing officedown package
</commit_message>
<xml_diff>
--- a/src/template.pptx
+++ b/src/template.pptx
@@ -211,7 +211,7 @@
           </a:lstStyle>
           <a:p>
             <a:fld id="{B566DE57-8385-0247-BEC0-99249BF238FA}" type="datetimeFigureOut">
-              <a:t>3/14/2021</a:t>
+              <a:t>3/15/2021</a:t>
             </a:fld>
             <a:endParaRPr lang="en-US"/>
           </a:p>
@@ -375,7 +375,7 @@
           </a:lstStyle>
           <a:p>
             <a:fld id="{33B11632-AF48-FC4B-A082-8C387D3BE013}" type="datetimeFigureOut">
-              <a:t>3/14/2021</a:t>
+              <a:t>3/15/2021</a:t>
             </a:fld>
             <a:endParaRPr lang="en-US"/>
           </a:p>
@@ -1069,6 +1069,154 @@
 </p:sldLayout>
 </file>
 
+<file path=ppt/slideLayouts/slideLayout3.xml><?xml version="1.0" encoding="utf-8"?>
+<p:sldLayout xmlns:a="http://schemas.openxmlformats.org/drawingml/2006/main" xmlns:r="http://schemas.openxmlformats.org/officeDocument/2006/relationships" xmlns:p="http://schemas.openxmlformats.org/presentationml/2006/main" preserve="1" userDrawn="1">
+  <p:cSld name="Title_and_table">
+    <p:spTree>
+      <p:nvGrpSpPr>
+        <p:cNvPr id="1" name=""/>
+        <p:cNvGrpSpPr/>
+        <p:nvPr/>
+      </p:nvGrpSpPr>
+      <p:grpSpPr>
+        <a:xfrm>
+          <a:off x="0" y="0"/>
+          <a:ext cx="0" cy="0"/>
+          <a:chOff x="0" y="0"/>
+          <a:chExt cx="0" cy="0"/>
+        </a:xfrm>
+      </p:grpSpPr>
+      <p:sp>
+        <p:nvSpPr>
+          <p:cNvPr id="6" name="slide_number"/>
+          <p:cNvSpPr txBox="1"/>
+          <p:nvPr userDrawn="1"/>
+        </p:nvSpPr>
+        <p:spPr>
+          <a:xfrm>
+            <a:off x="11352072" y="6503771"/>
+            <a:ext cx="372218" cy="276999"/>
+          </a:xfrm>
+          <a:prstGeom prst="rect">
+            <a:avLst/>
+          </a:prstGeom>
+          <a:noFill/>
+        </p:spPr>
+        <p:txBody>
+          <a:bodyPr wrap="none" rtlCol="0">
+            <a:spAutoFit/>
+          </a:bodyPr>
+          <a:lstStyle/>
+          <a:p>
+            <a:fld id="{E137FF19-2A38-444F-A227-0C960B8A40A8}" type="slidenum">
+              <a:rPr lang="en-CA" sz="1200" smtClean="0">
+                <a:solidFill>
+                  <a:schemeClr val="bg1"/>
+                </a:solidFill>
+              </a:rPr>
+              <a:t>‹#›</a:t>
+            </a:fld>
+            <a:endParaRPr lang="en-CA" sz="1200" dirty="0">
+              <a:solidFill>
+                <a:schemeClr val="bg1"/>
+              </a:solidFill>
+            </a:endParaRPr>
+          </a:p>
+        </p:txBody>
+      </p:sp>
+      <p:sp>
+        <p:nvSpPr>
+          <p:cNvPr id="5" name="table"/>
+          <p:cNvSpPr>
+            <a:spLocks noGrp="1"/>
+          </p:cNvSpPr>
+          <p:nvPr>
+            <p:ph sz="quarter" idx="11"/>
+          </p:nvPr>
+        </p:nvSpPr>
+        <p:spPr>
+          <a:xfrm>
+            <a:off x="379413" y="1423988"/>
+            <a:ext cx="11353800" cy="4621212"/>
+          </a:xfrm>
+        </p:spPr>
+        <p:txBody>
+          <a:bodyPr/>
+          <a:lstStyle/>
+          <a:p>
+            <a:pPr lvl="0"/>
+            <a:r>
+              <a:rPr lang="en-US" smtClean="0"/>
+              <a:t>Edit Master text styles</a:t>
+            </a:r>
+          </a:p>
+          <a:p>
+            <a:pPr lvl="1"/>
+            <a:r>
+              <a:rPr lang="en-US" smtClean="0"/>
+              <a:t>Second level</a:t>
+            </a:r>
+          </a:p>
+          <a:p>
+            <a:pPr lvl="2"/>
+            <a:r>
+              <a:rPr lang="en-US" smtClean="0"/>
+              <a:t>Third level</a:t>
+            </a:r>
+          </a:p>
+          <a:p>
+            <a:pPr lvl="3"/>
+            <a:r>
+              <a:rPr lang="en-US" smtClean="0"/>
+              <a:t>Fourth level</a:t>
+            </a:r>
+          </a:p>
+          <a:p>
+            <a:pPr lvl="4"/>
+            <a:r>
+              <a:rPr lang="en-US" smtClean="0"/>
+              <a:t>Fifth level</a:t>
+            </a:r>
+            <a:endParaRPr lang="en-CA"/>
+          </a:p>
+        </p:txBody>
+      </p:sp>
+      <p:sp>
+        <p:nvSpPr>
+          <p:cNvPr id="2" name="title"/>
+          <p:cNvSpPr>
+            <a:spLocks noGrp="1"/>
+          </p:cNvSpPr>
+          <p:nvPr>
+            <p:ph type="title"/>
+          </p:nvPr>
+        </p:nvSpPr>
+        <p:spPr/>
+        <p:txBody>
+          <a:bodyPr/>
+          <a:lstStyle/>
+          <a:p>
+            <a:r>
+              <a:rPr lang="en-US" smtClean="0"/>
+              <a:t>Click to edit Master title style</a:t>
+            </a:r>
+            <a:endParaRPr lang="en-CA"/>
+          </a:p>
+        </p:txBody>
+      </p:sp>
+    </p:spTree>
+    <p:extLst>
+      <p:ext uri="{BB962C8B-B14F-4D97-AF65-F5344CB8AC3E}">
+        <p14:creationId xmlns:p14="http://schemas.microsoft.com/office/powerpoint/2010/main" val="4232028077"/>
+      </p:ext>
+    </p:extLst>
+  </p:cSld>
+  <p:clrMapOvr>
+    <a:masterClrMapping/>
+  </p:clrMapOvr>
+</p:sldLayout>
+</file>
+
 <file path=ppt/slideMasters/slideMaster1.xml><?xml version="1.0" encoding="utf-8"?>
 <p:sldMaster xmlns:a="http://schemas.openxmlformats.org/drawingml/2006/main" xmlns:r="http://schemas.openxmlformats.org/officeDocument/2006/relationships" xmlns:p="http://schemas.openxmlformats.org/presentationml/2006/main">
   <p:cSld>
@@ -1103,7 +1251,7 @@
           <p:nvPr/>
         </p:nvPicPr>
         <p:blipFill>
-          <a:blip r:embed="rId4">
+          <a:blip r:embed="rId5">
             <a:extLst>
               <a:ext uri="{28A0092B-C50C-407E-A947-70E740481C1C}">
                 <a14:useLocalDpi xmlns:a14="http://schemas.microsoft.com/office/drawing/2010/main" val="0"/>
@@ -1266,6 +1414,7 @@
   <p:sldLayoutIdLst>
     <p:sldLayoutId id="2147483649" r:id="rId1"/>
     <p:sldLayoutId id="2147483650" r:id="rId2"/>
+    <p:sldLayoutId id="2147483651" r:id="rId3"/>
   </p:sldLayoutIdLst>
   <p:timing>
     <p:tnLst>

</xml_diff>

<commit_message>
working towards officedown, better error handling
</commit_message>
<xml_diff>
--- a/src/template.pptx
+++ b/src/template.pptx
@@ -211,7 +211,7 @@
           </a:lstStyle>
           <a:p>
             <a:fld id="{B566DE57-8385-0247-BEC0-99249BF238FA}" type="datetimeFigureOut">
-              <a:t>3/15/2021</a:t>
+              <a:t>3/16/2021</a:t>
             </a:fld>
             <a:endParaRPr lang="en-US"/>
           </a:p>
@@ -375,7 +375,7 @@
           </a:lstStyle>
           <a:p>
             <a:fld id="{33B11632-AF48-FC4B-A082-8C387D3BE013}" type="datetimeFigureOut">
-              <a:t>3/15/2021</a:t>
+              <a:t>3/16/2021</a:t>
             </a:fld>
             <a:endParaRPr lang="en-US"/>
           </a:p>
@@ -1696,6 +1696,35 @@
       </p:grpSpPr>
       <p:sp>
         <p:nvSpPr>
+          <p:cNvPr id="3" name="Subtitle 2"/>
+          <p:cNvSpPr>
+            <a:spLocks noGrp="1"/>
+          </p:cNvSpPr>
+          <p:nvPr>
+            <p:ph type="subTitle" idx="1"/>
+          </p:nvPr>
+        </p:nvSpPr>
+        <p:spPr>
+          <a:xfrm>
+            <a:off x="1779255" y="3004344"/>
+            <a:ext cx="8504309" cy="840981"/>
+          </a:xfrm>
+        </p:spPr>
+        <p:txBody>
+          <a:bodyPr>
+            <a:noAutofit/>
+          </a:bodyPr>
+          <a:lstStyle/>
+          <a:p>
+            <a:pPr algn="l"/>
+            <a:endParaRPr lang="en-US" dirty="0">
+              <a:cs typeface="Arial"/>
+            </a:endParaRPr>
+          </a:p>
+        </p:txBody>
+      </p:sp>
+      <p:sp>
+        <p:nvSpPr>
           <p:cNvPr id="2" name="Title 1"/>
           <p:cNvSpPr>
             <a:spLocks noGrp="1"/>
@@ -1712,35 +1741,6 @@
         </p:spPr>
         <p:txBody>
           <a:bodyPr anchor="b" anchorCtr="0">
-            <a:noAutofit/>
-          </a:bodyPr>
-          <a:lstStyle/>
-          <a:p>
-            <a:pPr algn="l"/>
-            <a:endParaRPr lang="en-US" dirty="0">
-              <a:cs typeface="Arial"/>
-            </a:endParaRPr>
-          </a:p>
-        </p:txBody>
-      </p:sp>
-      <p:sp>
-        <p:nvSpPr>
-          <p:cNvPr id="3" name="Subtitle 2"/>
-          <p:cNvSpPr>
-            <a:spLocks noGrp="1"/>
-          </p:cNvSpPr>
-          <p:nvPr>
-            <p:ph type="subTitle" idx="1"/>
-          </p:nvPr>
-        </p:nvSpPr>
-        <p:spPr>
-          <a:xfrm>
-            <a:off x="1779255" y="3004344"/>
-            <a:ext cx="8504309" cy="840981"/>
-          </a:xfrm>
-        </p:spPr>
-        <p:txBody>
-          <a:bodyPr>
             <a:noAutofit/>
           </a:bodyPr>
           <a:lstStyle/>
@@ -1799,25 +1799,6 @@
       </p:grpSpPr>
       <p:sp>
         <p:nvSpPr>
-          <p:cNvPr id="2" name="Title 1"/>
-          <p:cNvSpPr>
-            <a:spLocks noGrp="1"/>
-          </p:cNvSpPr>
-          <p:nvPr>
-            <p:ph type="title"/>
-          </p:nvPr>
-        </p:nvSpPr>
-        <p:spPr/>
-        <p:txBody>
-          <a:bodyPr/>
-          <a:lstStyle/>
-          <a:p>
-            <a:endParaRPr lang="en-US"/>
-          </a:p>
-        </p:txBody>
-      </p:sp>
-      <p:sp>
-        <p:nvSpPr>
           <p:cNvPr id="3" name="Content Placeholder 2"/>
           <p:cNvSpPr>
             <a:spLocks noGrp="1"/>
@@ -1837,24 +1818,17 @@
       </p:sp>
       <p:sp>
         <p:nvSpPr>
-          <p:cNvPr id="5" name="Text Placeholder 4"/>
+          <p:cNvPr id="2" name="Title 1"/>
           <p:cNvSpPr>
             <a:spLocks noGrp="1"/>
           </p:cNvSpPr>
           <p:nvPr>
-            <p:ph type="body" sz="quarter" idx="4294967295"/>
+            <p:ph type="title"/>
           </p:nvPr>
         </p:nvSpPr>
-        <p:spPr>
-          <a:xfrm>
-            <a:off x="378885" y="26460"/>
-            <a:ext cx="11442700" cy="342872"/>
-          </a:xfrm>
-        </p:spPr>
+        <p:spPr/>
         <p:txBody>
-          <a:bodyPr>
-            <a:normAutofit lnSpcReduction="10000"/>
-          </a:bodyPr>
+          <a:bodyPr/>
           <a:lstStyle/>
           <a:p>
             <a:endParaRPr lang="en-US"/>

</xml_diff>